<commit_message>
some edit to the presentation
</commit_message>
<xml_diff>
--- a/Presentation1 edited.pptx
+++ b/Presentation1 edited.pptx
@@ -10,8 +10,8 @@
     <p:sldId id="258" r:id="rId4"/>
     <p:sldId id="259" r:id="rId5"/>
     <p:sldId id="265" r:id="rId6"/>
-    <p:sldId id="260" r:id="rId7"/>
-    <p:sldId id="261" r:id="rId8"/>
+    <p:sldId id="261" r:id="rId7"/>
+    <p:sldId id="260" r:id="rId8"/>
     <p:sldId id="262" r:id="rId9"/>
     <p:sldId id="264" r:id="rId10"/>
   </p:sldIdLst>
@@ -3086,6 +3086,13 @@
   <p:clrMapOvr>
     <a:masterClrMapping/>
   </p:clrMapOvr>
+  <p:timing>
+    <p:tnLst>
+      <p:par>
+        <p:cTn id="1" dur="indefinite" restart="never" nodeType="tmRoot"/>
+      </p:par>
+    </p:tnLst>
+  </p:timing>
 </p:sld>
 </file>
 
@@ -3158,7 +3165,12 @@
             <p:ph idx="1"/>
           </p:nvPr>
         </p:nvSpPr>
-        <p:spPr/>
+        <p:spPr>
+          <a:xfrm>
+            <a:off x="838200" y="1459865"/>
+            <a:ext cx="10515600" cy="4351338"/>
+          </a:xfrm>
+        </p:spPr>
         <p:txBody>
           <a:bodyPr>
             <a:normAutofit/>
@@ -3173,17 +3185,10 @@
                 <a:latin typeface="Andalus" panose="02020603050405020304" pitchFamily="18" charset="-78"/>
                 <a:cs typeface="Andalus" panose="02020603050405020304" pitchFamily="18" charset="-78"/>
               </a:rPr>
-              <a:t>In a world full of sins, the Demons invade the globe as a punishment </a:t>
-            </a:r>
-            <a:r>
-              <a:rPr lang="en-US" sz="3200">
-                <a:latin typeface="Andalus" panose="02020603050405020304" pitchFamily="18" charset="-78"/>
-                <a:cs typeface="Andalus" panose="02020603050405020304" pitchFamily="18" charset="-78"/>
-              </a:rPr>
-              <a:t>from </a:t>
-            </a:r>
-            <a:r>
-              <a:rPr lang="en-US" sz="3200" smtClean="0">
+              <a:t>In a world full of sins, the Demons invade the globe as a punishment from </a:t>
+            </a:r>
+            <a:r>
+              <a:rPr lang="en-US" sz="3200" dirty="0" smtClean="0">
                 <a:latin typeface="Andalus" panose="02020603050405020304" pitchFamily="18" charset="-78"/>
                 <a:cs typeface="Andalus" panose="02020603050405020304" pitchFamily="18" charset="-78"/>
               </a:rPr>
@@ -3194,7 +3199,21 @@
                 <a:latin typeface="Andalus" panose="02020603050405020304" pitchFamily="18" charset="-78"/>
                 <a:cs typeface="Andalus" panose="02020603050405020304" pitchFamily="18" charset="-78"/>
               </a:rPr>
-              <a:t>and the epidemic spread in many dangerous types. Our hero </a:t>
+              <a:t>and the epidemic spread in many </a:t>
+            </a:r>
+            <a:r>
+              <a:rPr lang="en-US" sz="3200" dirty="0" smtClean="0">
+                <a:latin typeface="Andalus" panose="02020603050405020304" pitchFamily="18" charset="-78"/>
+                <a:cs typeface="Andalus" panose="02020603050405020304" pitchFamily="18" charset="-78"/>
+              </a:rPr>
+              <a:t>dangerous and different forms. </a:t>
+            </a:r>
+            <a:r>
+              <a:rPr lang="en-US" sz="3200" dirty="0">
+                <a:latin typeface="Andalus" panose="02020603050405020304" pitchFamily="18" charset="-78"/>
+                <a:cs typeface="Andalus" panose="02020603050405020304" pitchFamily="18" charset="-78"/>
+              </a:rPr>
+              <a:t>Our hero </a:t>
             </a:r>
             <a:r>
               <a:rPr lang="en-US" sz="3200" b="1" dirty="0">
@@ -3217,6 +3236,36 @@
           </a:p>
         </p:txBody>
       </p:sp>
+      <p:pic>
+        <p:nvPicPr>
+          <p:cNvPr id="4" name="Picture 3"/>
+          <p:cNvPicPr>
+            <a:picLocks noChangeAspect="1"/>
+          </p:cNvPicPr>
+          <p:nvPr/>
+        </p:nvPicPr>
+        <p:blipFill>
+          <a:blip r:embed="rId2" cstate="print">
+            <a:extLst>
+              <a:ext uri="{28A0092B-C50C-407E-A947-70E740481C1C}">
+                <a14:useLocalDpi xmlns:a14="http://schemas.microsoft.com/office/drawing/2010/main" val="0"/>
+              </a:ext>
+            </a:extLst>
+          </a:blip>
+          <a:stretch>
+            <a:fillRect/>
+          </a:stretch>
+        </p:blipFill>
+        <p:spPr>
+          <a:xfrm>
+            <a:off x="2076995" y="3704625"/>
+            <a:ext cx="7715794" cy="3086318"/>
+          </a:xfrm>
+          <a:prstGeom prst="rect">
+            <a:avLst/>
+          </a:prstGeom>
+        </p:spPr>
+      </p:pic>
     </p:spTree>
     <p:extLst>
       <p:ext uri="{BB962C8B-B14F-4D97-AF65-F5344CB8AC3E}">
@@ -3227,6 +3276,13 @@
   <p:clrMapOvr>
     <a:masterClrMapping/>
   </p:clrMapOvr>
+  <p:timing>
+    <p:tnLst>
+      <p:par>
+        <p:cTn id="1" dur="indefinite" restart="never" nodeType="tmRoot"/>
+      </p:par>
+    </p:tnLst>
+  </p:timing>
 </p:sld>
 </file>
 
@@ -3353,6 +3409,13 @@
   <p:clrMapOvr>
     <a:masterClrMapping/>
   </p:clrMapOvr>
+  <p:timing>
+    <p:tnLst>
+      <p:par>
+        <p:cTn id="1" dur="indefinite" restart="never" nodeType="tmRoot"/>
+      </p:par>
+    </p:tnLst>
+  </p:timing>
 </p:sld>
 </file>
 
@@ -4018,570 +4081,6 @@
             <p:ph type="title"/>
           </p:nvPr>
         </p:nvSpPr>
-        <p:spPr>
-          <a:xfrm>
-            <a:off x="576943" y="783136"/>
-            <a:ext cx="10515600" cy="1325563"/>
-          </a:xfrm>
-        </p:spPr>
-        <p:txBody>
-          <a:bodyPr>
-            <a:normAutofit fontScale="90000"/>
-          </a:bodyPr>
-          <a:lstStyle/>
-          <a:p>
-            <a:pPr algn="ctr"/>
-            <a:r>
-              <a:rPr lang="fr-FR" b="1" i="1" dirty="0">
-                <a:latin typeface="Andalus" panose="02020603050405020304" pitchFamily="18" charset="-78"/>
-                <a:cs typeface="Andalus" panose="02020603050405020304" pitchFamily="18" charset="-78"/>
-              </a:rPr>
-              <a:t/>
-            </a:r>
-            <a:br>
-              <a:rPr lang="fr-FR" b="1" i="1" dirty="0">
-                <a:latin typeface="Andalus" panose="02020603050405020304" pitchFamily="18" charset="-78"/>
-                <a:cs typeface="Andalus" panose="02020603050405020304" pitchFamily="18" charset="-78"/>
-              </a:rPr>
-            </a:br>
-            <a:r>
-              <a:rPr lang="en-US" b="1" i="1" dirty="0">
-                <a:latin typeface="Andalus" panose="02020603050405020304" pitchFamily="18" charset="-78"/>
-                <a:cs typeface="Andalus" panose="02020603050405020304" pitchFamily="18" charset="-78"/>
-              </a:rPr>
-              <a:t>w</a:t>
-            </a:r>
-            <a:r>
-              <a:rPr lang="fr-FR" sz="3600" b="1" i="1" dirty="0">
-                <a:latin typeface="Andalus" panose="02020603050405020304" pitchFamily="18" charset="-78"/>
-                <a:cs typeface="Andalus" panose="02020603050405020304" pitchFamily="18" charset="-78"/>
-              </a:rPr>
-              <a:t>est</a:t>
-            </a:r>
-            <a:r>
-              <a:rPr lang="fr-FR" b="1" i="1" dirty="0">
-                <a:latin typeface="Andalus" panose="02020603050405020304" pitchFamily="18" charset="-78"/>
-                <a:cs typeface="Andalus" panose="02020603050405020304" pitchFamily="18" charset="-78"/>
-              </a:rPr>
-              <a:t/>
-            </a:r>
-            <a:br>
-              <a:rPr lang="fr-FR" b="1" i="1" dirty="0">
-                <a:latin typeface="Andalus" panose="02020603050405020304" pitchFamily="18" charset="-78"/>
-                <a:cs typeface="Andalus" panose="02020603050405020304" pitchFamily="18" charset="-78"/>
-              </a:rPr>
-            </a:br>
-            <a:r>
-              <a:rPr lang="fr-FR" sz="2700" b="1" i="1" dirty="0">
-                <a:latin typeface="Andalus" panose="02020603050405020304" pitchFamily="18" charset="-78"/>
-                <a:cs typeface="Andalus" panose="02020603050405020304" pitchFamily="18" charset="-78"/>
-              </a:rPr>
-              <a:t>Y</a:t>
-            </a:r>
-            <a:r>
-              <a:rPr lang="fr-FR" sz="2700" dirty="0">
-                <a:latin typeface="Andalus" panose="02020603050405020304" pitchFamily="18" charset="-78"/>
-                <a:cs typeface="Andalus" panose="02020603050405020304" pitchFamily="18" charset="-78"/>
-              </a:rPr>
-              <a:t>ou </a:t>
-            </a:r>
-            <a:r>
-              <a:rPr lang="fr-FR" sz="2700" dirty="0" err="1">
-                <a:latin typeface="Andalus" panose="02020603050405020304" pitchFamily="18" charset="-78"/>
-                <a:cs typeface="Andalus" panose="02020603050405020304" pitchFamily="18" charset="-78"/>
-              </a:rPr>
-              <a:t>will</a:t>
-            </a:r>
-            <a:r>
-              <a:rPr lang="fr-FR" sz="2700" dirty="0">
-                <a:latin typeface="Andalus" panose="02020603050405020304" pitchFamily="18" charset="-78"/>
-                <a:cs typeface="Andalus" panose="02020603050405020304" pitchFamily="18" charset="-78"/>
-              </a:rPr>
-              <a:t> </a:t>
-            </a:r>
-            <a:r>
-              <a:rPr lang="fr-FR" sz="2700" dirty="0" err="1">
-                <a:latin typeface="Andalus" panose="02020603050405020304" pitchFamily="18" charset="-78"/>
-                <a:cs typeface="Andalus" panose="02020603050405020304" pitchFamily="18" charset="-78"/>
-              </a:rPr>
-              <a:t>find</a:t>
-            </a:r>
-            <a:r>
-              <a:rPr lang="fr-FR" sz="2700" dirty="0">
-                <a:latin typeface="Andalus" panose="02020603050405020304" pitchFamily="18" charset="-78"/>
-                <a:cs typeface="Andalus" panose="02020603050405020304" pitchFamily="18" charset="-78"/>
-              </a:rPr>
-              <a:t> a </a:t>
-            </a:r>
-            <a:r>
-              <a:rPr lang="en-US" sz="2700" dirty="0">
-                <a:latin typeface="Andalus" panose="02020603050405020304" pitchFamily="18" charset="-78"/>
-                <a:cs typeface="Andalus" panose="02020603050405020304" pitchFamily="18" charset="-78"/>
-              </a:rPr>
-              <a:t>very</a:t>
-            </a:r>
-            <a:r>
-              <a:rPr lang="fr-FR" sz="2700" dirty="0">
-                <a:latin typeface="Andalus" panose="02020603050405020304" pitchFamily="18" charset="-78"/>
-                <a:cs typeface="Andalus" panose="02020603050405020304" pitchFamily="18" charset="-78"/>
-              </a:rPr>
-              <a:t> </a:t>
-            </a:r>
-            <a:r>
-              <a:rPr lang="fr-FR" sz="2700" dirty="0" err="1">
-                <a:latin typeface="Andalus" panose="02020603050405020304" pitchFamily="18" charset="-78"/>
-                <a:cs typeface="Andalus" panose="02020603050405020304" pitchFamily="18" charset="-78"/>
-              </a:rPr>
-              <a:t>dark</a:t>
-            </a:r>
-            <a:r>
-              <a:rPr lang="fr-FR" sz="2700" dirty="0">
-                <a:latin typeface="Andalus" panose="02020603050405020304" pitchFamily="18" charset="-78"/>
-                <a:cs typeface="Andalus" panose="02020603050405020304" pitchFamily="18" charset="-78"/>
-              </a:rPr>
-              <a:t> and </a:t>
-            </a:r>
-            <a:r>
-              <a:rPr lang="fr-FR" sz="2700" dirty="0" err="1">
-                <a:latin typeface="Andalus" panose="02020603050405020304" pitchFamily="18" charset="-78"/>
-                <a:cs typeface="Andalus" panose="02020603050405020304" pitchFamily="18" charset="-78"/>
-              </a:rPr>
-              <a:t>scary</a:t>
-            </a:r>
-            <a:r>
-              <a:rPr lang="fr-FR" sz="2700" dirty="0">
-                <a:latin typeface="Andalus" panose="02020603050405020304" pitchFamily="18" charset="-78"/>
-                <a:cs typeface="Andalus" panose="02020603050405020304" pitchFamily="18" charset="-78"/>
-              </a:rPr>
-              <a:t> house</a:t>
-            </a:r>
-            <a:br>
-              <a:rPr lang="fr-FR" sz="2700" dirty="0">
-                <a:latin typeface="Andalus" panose="02020603050405020304" pitchFamily="18" charset="-78"/>
-                <a:cs typeface="Andalus" panose="02020603050405020304" pitchFamily="18" charset="-78"/>
-              </a:rPr>
-            </a:br>
-            <a:endParaRPr lang="fr-FR" sz="2700" dirty="0">
-              <a:latin typeface="Andalus" panose="02020603050405020304" pitchFamily="18" charset="-78"/>
-              <a:cs typeface="Andalus" panose="02020603050405020304" pitchFamily="18" charset="-78"/>
-            </a:endParaRPr>
-          </a:p>
-        </p:txBody>
-      </p:sp>
-      <p:sp>
-        <p:nvSpPr>
-          <p:cNvPr id="3" name="Content Placeholder 2"/>
-          <p:cNvSpPr>
-            <a:spLocks noGrp="1"/>
-          </p:cNvSpPr>
-          <p:nvPr>
-            <p:ph idx="1"/>
-          </p:nvPr>
-        </p:nvSpPr>
-        <p:spPr>
-          <a:xfrm>
-            <a:off x="780506" y="2108699"/>
-            <a:ext cx="10515600" cy="1392306"/>
-          </a:xfrm>
-        </p:spPr>
-        <p:txBody>
-          <a:bodyPr/>
-          <a:lstStyle/>
-          <a:p>
-            <a:pPr marL="0" indent="0" algn="ctr">
-              <a:buNone/>
-            </a:pPr>
-            <a:r>
-              <a:rPr lang="fr-FR" sz="2000" dirty="0">
-                <a:latin typeface="Andalus" panose="02020603050405020304" pitchFamily="18" charset="-78"/>
-                <a:cs typeface="Andalus" panose="02020603050405020304" pitchFamily="18" charset="-78"/>
-              </a:rPr>
-              <a:t>If </a:t>
-            </a:r>
-            <a:r>
-              <a:rPr lang="fr-FR" sz="2000" dirty="0" err="1">
-                <a:latin typeface="Andalus" panose="02020603050405020304" pitchFamily="18" charset="-78"/>
-                <a:cs typeface="Andalus" panose="02020603050405020304" pitchFamily="18" charset="-78"/>
-              </a:rPr>
-              <a:t>you</a:t>
-            </a:r>
-            <a:r>
-              <a:rPr lang="fr-FR" sz="2000" dirty="0">
-                <a:latin typeface="Andalus" panose="02020603050405020304" pitchFamily="18" charset="-78"/>
-                <a:cs typeface="Andalus" panose="02020603050405020304" pitchFamily="18" charset="-78"/>
-              </a:rPr>
-              <a:t> </a:t>
-            </a:r>
-            <a:r>
-              <a:rPr lang="fr-FR" sz="2000" dirty="0" err="1">
-                <a:latin typeface="Andalus" panose="02020603050405020304" pitchFamily="18" charset="-78"/>
-                <a:cs typeface="Andalus" panose="02020603050405020304" pitchFamily="18" charset="-78"/>
-              </a:rPr>
-              <a:t>choose</a:t>
-            </a:r>
-            <a:r>
-              <a:rPr lang="fr-FR" sz="2000" dirty="0">
-                <a:latin typeface="Andalus" panose="02020603050405020304" pitchFamily="18" charset="-78"/>
-                <a:cs typeface="Andalus" panose="02020603050405020304" pitchFamily="18" charset="-78"/>
-              </a:rPr>
-              <a:t> to enter </a:t>
-            </a:r>
-            <a:r>
-              <a:rPr lang="fr-FR" sz="2000" dirty="0" err="1">
-                <a:latin typeface="Andalus" panose="02020603050405020304" pitchFamily="18" charset="-78"/>
-                <a:cs typeface="Andalus" panose="02020603050405020304" pitchFamily="18" charset="-78"/>
-              </a:rPr>
-              <a:t>it</a:t>
-            </a:r>
-            <a:r>
-              <a:rPr lang="fr-FR" sz="2000" dirty="0">
-                <a:latin typeface="Andalus" panose="02020603050405020304" pitchFamily="18" charset="-78"/>
-                <a:cs typeface="Andalus" panose="02020603050405020304" pitchFamily="18" charset="-78"/>
-              </a:rPr>
-              <a:t> </a:t>
-            </a:r>
-            <a:r>
-              <a:rPr lang="fr-FR" sz="2000" dirty="0" err="1">
-                <a:latin typeface="Andalus" panose="02020603050405020304" pitchFamily="18" charset="-78"/>
-                <a:cs typeface="Andalus" panose="02020603050405020304" pitchFamily="18" charset="-78"/>
-              </a:rPr>
-              <a:t>you</a:t>
-            </a:r>
-            <a:r>
-              <a:rPr lang="fr-FR" sz="2000" dirty="0">
-                <a:latin typeface="Andalus" panose="02020603050405020304" pitchFamily="18" charset="-78"/>
-                <a:cs typeface="Andalus" panose="02020603050405020304" pitchFamily="18" charset="-78"/>
-              </a:rPr>
-              <a:t> have to </a:t>
-            </a:r>
-            <a:r>
-              <a:rPr lang="fr-FR" sz="2000" dirty="0" err="1">
-                <a:latin typeface="Andalus" panose="02020603050405020304" pitchFamily="18" charset="-78"/>
-                <a:cs typeface="Andalus" panose="02020603050405020304" pitchFamily="18" charset="-78"/>
-              </a:rPr>
-              <a:t>choose</a:t>
-            </a:r>
-            <a:r>
-              <a:rPr lang="fr-FR" sz="2000" dirty="0">
-                <a:latin typeface="Andalus" panose="02020603050405020304" pitchFamily="18" charset="-78"/>
-                <a:cs typeface="Andalus" panose="02020603050405020304" pitchFamily="18" charset="-78"/>
-              </a:rPr>
-              <a:t> </a:t>
-            </a:r>
-            <a:r>
-              <a:rPr lang="fr-FR" sz="2000" dirty="0" err="1">
-                <a:latin typeface="Andalus" panose="02020603050405020304" pitchFamily="18" charset="-78"/>
-                <a:cs typeface="Andalus" panose="02020603050405020304" pitchFamily="18" charset="-78"/>
-              </a:rPr>
-              <a:t>between</a:t>
-            </a:r>
-            <a:endParaRPr lang="fr-FR" sz="2000" dirty="0">
-              <a:latin typeface="Andalus" panose="02020603050405020304" pitchFamily="18" charset="-78"/>
-              <a:cs typeface="Andalus" panose="02020603050405020304" pitchFamily="18" charset="-78"/>
-            </a:endParaRPr>
-          </a:p>
-          <a:p>
-            <a:pPr marL="0" indent="0">
-              <a:buNone/>
-            </a:pPr>
-            <a:endParaRPr lang="fr-FR" dirty="0">
-              <a:latin typeface="Andalus" panose="02020603050405020304" pitchFamily="18" charset="-78"/>
-              <a:cs typeface="Andalus" panose="02020603050405020304" pitchFamily="18" charset="-78"/>
-            </a:endParaRPr>
-          </a:p>
-        </p:txBody>
-      </p:sp>
-      <p:pic>
-        <p:nvPicPr>
-          <p:cNvPr id="4" name="Picture 3"/>
-          <p:cNvPicPr>
-            <a:picLocks noChangeAspect="1"/>
-          </p:cNvPicPr>
-          <p:nvPr/>
-        </p:nvPicPr>
-        <p:blipFill>
-          <a:blip r:embed="rId2">
-            <a:extLst>
-              <a:ext uri="{28A0092B-C50C-407E-A947-70E740481C1C}">
-                <a14:useLocalDpi xmlns:a14="http://schemas.microsoft.com/office/drawing/2010/main" val="0"/>
-              </a:ext>
-            </a:extLst>
-          </a:blip>
-          <a:stretch>
-            <a:fillRect/>
-          </a:stretch>
-        </p:blipFill>
-        <p:spPr>
-          <a:xfrm>
-            <a:off x="3419475" y="3536767"/>
-            <a:ext cx="5353050" cy="2914650"/>
-          </a:xfrm>
-          <a:prstGeom prst="rect">
-            <a:avLst/>
-          </a:prstGeom>
-        </p:spPr>
-      </p:pic>
-      <p:sp>
-        <p:nvSpPr>
-          <p:cNvPr id="5" name="TextBox 4">
-            <a:extLst>
-              <a:ext uri="{FF2B5EF4-FFF2-40B4-BE49-F238E27FC236}">
-                <a16:creationId xmlns:a16="http://schemas.microsoft.com/office/drawing/2014/main" id="{A2B54435-60ED-4DD9-9468-50A6F075DC44}"/>
-              </a:ext>
-            </a:extLst>
-          </p:cNvPr>
-          <p:cNvSpPr txBox="1"/>
-          <p:nvPr/>
-        </p:nvSpPr>
-        <p:spPr>
-          <a:xfrm>
-            <a:off x="3855720" y="2985004"/>
-            <a:ext cx="1417320" cy="369332"/>
-          </a:xfrm>
-          <a:prstGeom prst="rect">
-            <a:avLst/>
-          </a:prstGeom>
-          <a:noFill/>
-        </p:spPr>
-        <p:txBody>
-          <a:bodyPr wrap="square" rtlCol="0">
-            <a:spAutoFit/>
-          </a:bodyPr>
-          <a:lstStyle/>
-          <a:p>
-            <a:r>
-              <a:rPr lang="fr-FR" sz="1800" dirty="0" err="1">
-                <a:latin typeface="Andalus" panose="02020603050405020304" pitchFamily="18" charset="-78"/>
-                <a:cs typeface="Andalus" panose="02020603050405020304" pitchFamily="18" charset="-78"/>
-              </a:rPr>
-              <a:t>kill</a:t>
-            </a:r>
-            <a:r>
-              <a:rPr lang="fr-FR" sz="1800" dirty="0">
-                <a:latin typeface="Andalus" panose="02020603050405020304" pitchFamily="18" charset="-78"/>
-                <a:cs typeface="Andalus" panose="02020603050405020304" pitchFamily="18" charset="-78"/>
-              </a:rPr>
-              <a:t> </a:t>
-            </a:r>
-            <a:r>
-              <a:rPr lang="en-US" sz="1800" dirty="0">
-                <a:latin typeface="Andalus" panose="02020603050405020304" pitchFamily="18" charset="-78"/>
-                <a:cs typeface="Andalus" panose="02020603050405020304" pitchFamily="18" charset="-78"/>
-              </a:rPr>
-              <a:t>your</a:t>
-            </a:r>
-            <a:r>
-              <a:rPr lang="fr-FR" sz="1800" dirty="0">
-                <a:latin typeface="Andalus" panose="02020603050405020304" pitchFamily="18" charset="-78"/>
-                <a:cs typeface="Andalus" panose="02020603050405020304" pitchFamily="18" charset="-78"/>
-              </a:rPr>
-              <a:t> son</a:t>
-            </a:r>
-            <a:endParaRPr lang="en-US" dirty="0"/>
-          </a:p>
-        </p:txBody>
-      </p:sp>
-      <p:sp>
-        <p:nvSpPr>
-          <p:cNvPr id="6" name="TextBox 5">
-            <a:extLst>
-              <a:ext uri="{FF2B5EF4-FFF2-40B4-BE49-F238E27FC236}">
-                <a16:creationId xmlns:a16="http://schemas.microsoft.com/office/drawing/2014/main" id="{72854E52-C68C-460E-AAB7-F9BA320C5587}"/>
-              </a:ext>
-            </a:extLst>
-          </p:cNvPr>
-          <p:cNvSpPr txBox="1"/>
-          <p:nvPr/>
-        </p:nvSpPr>
-        <p:spPr>
-          <a:xfrm>
-            <a:off x="6347597" y="3031170"/>
-            <a:ext cx="1936976" cy="646331"/>
-          </a:xfrm>
-          <a:prstGeom prst="rect">
-            <a:avLst/>
-          </a:prstGeom>
-          <a:noFill/>
-        </p:spPr>
-        <p:txBody>
-          <a:bodyPr wrap="square" rtlCol="0">
-            <a:spAutoFit/>
-          </a:bodyPr>
-          <a:lstStyle/>
-          <a:p>
-            <a:r>
-              <a:rPr lang="fr-FR" sz="1800" dirty="0">
-                <a:latin typeface="Andalus" panose="02020603050405020304" pitchFamily="18" charset="-78"/>
-                <a:cs typeface="Andalus" panose="02020603050405020304" pitchFamily="18" charset="-78"/>
-              </a:rPr>
-              <a:t>let </a:t>
-            </a:r>
-            <a:r>
-              <a:rPr lang="fr-FR" sz="1800" dirty="0" err="1">
-                <a:latin typeface="Andalus" panose="02020603050405020304" pitchFamily="18" charset="-78"/>
-                <a:cs typeface="Andalus" panose="02020603050405020304" pitchFamily="18" charset="-78"/>
-              </a:rPr>
-              <a:t>him</a:t>
-            </a:r>
-            <a:r>
-              <a:rPr lang="fr-FR" sz="1800" dirty="0">
-                <a:latin typeface="Andalus" panose="02020603050405020304" pitchFamily="18" charset="-78"/>
-                <a:cs typeface="Andalus" panose="02020603050405020304" pitchFamily="18" charset="-78"/>
-              </a:rPr>
-              <a:t> </a:t>
-            </a:r>
-            <a:r>
-              <a:rPr lang="fr-FR" sz="1800" dirty="0" err="1">
-                <a:latin typeface="Andalus" panose="02020603050405020304" pitchFamily="18" charset="-78"/>
-                <a:cs typeface="Andalus" panose="02020603050405020304" pitchFamily="18" charset="-78"/>
-              </a:rPr>
-              <a:t>kills</a:t>
-            </a:r>
-            <a:r>
-              <a:rPr lang="ar-LB" sz="1800" dirty="0">
-                <a:latin typeface="Andalus" panose="02020603050405020304" pitchFamily="18" charset="-78"/>
-                <a:cs typeface="Andalus" panose="02020603050405020304" pitchFamily="18" charset="-78"/>
-              </a:rPr>
-              <a:t> </a:t>
-            </a:r>
-            <a:r>
-              <a:rPr lang="en-US" sz="1800" dirty="0">
-                <a:latin typeface="Andalus" panose="02020603050405020304" pitchFamily="18" charset="-78"/>
-                <a:cs typeface="Andalus" panose="02020603050405020304" pitchFamily="18" charset="-78"/>
-              </a:rPr>
-              <a:t> you</a:t>
-            </a:r>
-            <a:r>
-              <a:rPr lang="fr-FR" dirty="0">
-                <a:latin typeface="Andalus" panose="02020603050405020304" pitchFamily="18" charset="-78"/>
-                <a:cs typeface="Andalus" panose="02020603050405020304" pitchFamily="18" charset="-78"/>
-              </a:rPr>
-              <a:t>.</a:t>
-            </a:r>
-          </a:p>
-          <a:p>
-            <a:endParaRPr lang="en-US" dirty="0"/>
-          </a:p>
-        </p:txBody>
-      </p:sp>
-      <p:cxnSp>
-        <p:nvCxnSpPr>
-          <p:cNvPr id="8" name="Straight Arrow Connector 7">
-            <a:extLst>
-              <a:ext uri="{FF2B5EF4-FFF2-40B4-BE49-F238E27FC236}">
-                <a16:creationId xmlns:a16="http://schemas.microsoft.com/office/drawing/2014/main" id="{AD21A608-CFD8-470E-937F-1F68906A1D17}"/>
-              </a:ext>
-            </a:extLst>
-          </p:cNvPr>
-          <p:cNvCxnSpPr/>
-          <p:nvPr/>
-        </p:nvCxnSpPr>
-        <p:spPr>
-          <a:xfrm flipH="1">
-            <a:off x="4869180" y="2499360"/>
-            <a:ext cx="1169126" cy="485644"/>
-          </a:xfrm>
-          <a:prstGeom prst="straightConnector1">
-            <a:avLst/>
-          </a:prstGeom>
-          <a:ln>
-            <a:tailEnd type="triangle"/>
-          </a:ln>
-        </p:spPr>
-        <p:style>
-          <a:lnRef idx="1">
-            <a:schemeClr val="dk1"/>
-          </a:lnRef>
-          <a:fillRef idx="0">
-            <a:schemeClr val="dk1"/>
-          </a:fillRef>
-          <a:effectRef idx="0">
-            <a:schemeClr val="dk1"/>
-          </a:effectRef>
-          <a:fontRef idx="minor">
-            <a:schemeClr val="tx1"/>
-          </a:fontRef>
-        </p:style>
-      </p:cxnSp>
-      <p:cxnSp>
-        <p:nvCxnSpPr>
-          <p:cNvPr id="10" name="Straight Arrow Connector 9">
-            <a:extLst>
-              <a:ext uri="{FF2B5EF4-FFF2-40B4-BE49-F238E27FC236}">
-                <a16:creationId xmlns:a16="http://schemas.microsoft.com/office/drawing/2014/main" id="{82043F52-66A8-4202-A301-A03A7D6EFB54}"/>
-              </a:ext>
-            </a:extLst>
-          </p:cNvPr>
-          <p:cNvCxnSpPr/>
-          <p:nvPr/>
-        </p:nvCxnSpPr>
-        <p:spPr>
-          <a:xfrm>
-            <a:off x="6038306" y="2506980"/>
-            <a:ext cx="880656" cy="524190"/>
-          </a:xfrm>
-          <a:prstGeom prst="straightConnector1">
-            <a:avLst/>
-          </a:prstGeom>
-          <a:ln>
-            <a:tailEnd type="triangle"/>
-          </a:ln>
-        </p:spPr>
-        <p:style>
-          <a:lnRef idx="1">
-            <a:schemeClr val="dk1"/>
-          </a:lnRef>
-          <a:fillRef idx="0">
-            <a:schemeClr val="dk1"/>
-          </a:fillRef>
-          <a:effectRef idx="0">
-            <a:schemeClr val="dk1"/>
-          </a:effectRef>
-          <a:fontRef idx="minor">
-            <a:schemeClr val="tx1"/>
-          </a:fontRef>
-        </p:style>
-      </p:cxnSp>
-    </p:spTree>
-    <p:extLst>
-      <p:ext uri="{BB962C8B-B14F-4D97-AF65-F5344CB8AC3E}">
-        <p14:creationId xmlns:p14="http://schemas.microsoft.com/office/powerpoint/2010/main" val="1219533852"/>
-      </p:ext>
-    </p:extLst>
-  </p:cSld>
-  <p:clrMapOvr>
-    <a:masterClrMapping/>
-  </p:clrMapOvr>
-</p:sld>
-</file>
-
-<file path=ppt/slides/slide7.xml><?xml version="1.0" encoding="utf-8"?>
-<p:sld xmlns:a="http://schemas.openxmlformats.org/drawingml/2006/main" xmlns:r="http://schemas.openxmlformats.org/officeDocument/2006/relationships" xmlns:p="http://schemas.openxmlformats.org/presentationml/2006/main">
-  <p:cSld>
-    <p:spTree>
-      <p:nvGrpSpPr>
-        <p:cNvPr id="1" name=""/>
-        <p:cNvGrpSpPr/>
-        <p:nvPr/>
-      </p:nvGrpSpPr>
-      <p:grpSpPr>
-        <a:xfrm>
-          <a:off x="0" y="0"/>
-          <a:ext cx="0" cy="0"/>
-          <a:chOff x="0" y="0"/>
-          <a:chExt cx="0" cy="0"/>
-        </a:xfrm>
-      </p:grpSpPr>
-      <p:sp>
-        <p:nvSpPr>
-          <p:cNvPr id="2" name="Title 1"/>
-          <p:cNvSpPr>
-            <a:spLocks noGrp="1"/>
-          </p:cNvSpPr>
-          <p:nvPr>
-            <p:ph type="title"/>
-          </p:nvPr>
-        </p:nvSpPr>
         <p:spPr/>
         <p:txBody>
           <a:bodyPr/>
@@ -4660,11 +4159,11 @@
               <a:t>Then choose </a:t>
             </a:r>
             <a:r>
-              <a:rPr lang="en-US" sz="2400" dirty="0" err="1">
-                <a:latin typeface="Andalus" panose="02020603050405020304" pitchFamily="18" charset="-78"/>
-                <a:cs typeface="Andalus" panose="02020603050405020304" pitchFamily="18" charset="-78"/>
-              </a:rPr>
-              <a:t>betwen</a:t>
+              <a:rPr lang="en-US" sz="2400" dirty="0" smtClean="0">
+                <a:latin typeface="Andalus" panose="02020603050405020304" pitchFamily="18" charset="-78"/>
+                <a:cs typeface="Andalus" panose="02020603050405020304" pitchFamily="18" charset="-78"/>
+              </a:rPr>
+              <a:t>between</a:t>
             </a:r>
             <a:endParaRPr lang="en-US" sz="2400" dirty="0">
               <a:latin typeface="Andalus" panose="02020603050405020304" pitchFamily="18" charset="-78"/>
@@ -4825,7 +4324,7 @@
         <p:spPr>
           <a:xfrm>
             <a:off x="6568710" y="2518286"/>
-            <a:ext cx="2765789" cy="646331"/>
+            <a:ext cx="3541941" cy="646331"/>
           </a:xfrm>
           <a:prstGeom prst="rect">
             <a:avLst/>
@@ -4850,7 +4349,14 @@
                 <a:latin typeface="Andalus" panose="02020603050405020304" pitchFamily="18" charset="-78"/>
                 <a:cs typeface="Andalus" panose="02020603050405020304" pitchFamily="18" charset="-78"/>
               </a:rPr>
-              <a:t>ontinue and kill the second Demon to save the</a:t>
+              <a:t>ontinue and kill the second Demon to save </a:t>
+            </a:r>
+            <a:r>
+              <a:rPr lang="en-US" sz="1800" dirty="0" smtClean="0">
+                <a:latin typeface="Andalus" panose="02020603050405020304" pitchFamily="18" charset="-78"/>
+                <a:cs typeface="Andalus" panose="02020603050405020304" pitchFamily="18" charset="-78"/>
+              </a:rPr>
+              <a:t>the sick mother</a:t>
             </a:r>
             <a:endParaRPr lang="en-US" dirty="0"/>
           </a:p>
@@ -4940,6 +4446,567 @@
     <p:extLst>
       <p:ext uri="{BB962C8B-B14F-4D97-AF65-F5344CB8AC3E}">
         <p14:creationId xmlns:p14="http://schemas.microsoft.com/office/powerpoint/2010/main" val="3101218352"/>
+      </p:ext>
+    </p:extLst>
+  </p:cSld>
+  <p:clrMapOvr>
+    <a:masterClrMapping/>
+  </p:clrMapOvr>
+</p:sld>
+</file>
+
+<file path=ppt/slides/slide7.xml><?xml version="1.0" encoding="utf-8"?>
+<p:sld xmlns:a="http://schemas.openxmlformats.org/drawingml/2006/main" xmlns:r="http://schemas.openxmlformats.org/officeDocument/2006/relationships" xmlns:p="http://schemas.openxmlformats.org/presentationml/2006/main">
+  <p:cSld>
+    <p:spTree>
+      <p:nvGrpSpPr>
+        <p:cNvPr id="1" name=""/>
+        <p:cNvGrpSpPr/>
+        <p:nvPr/>
+      </p:nvGrpSpPr>
+      <p:grpSpPr>
+        <a:xfrm>
+          <a:off x="0" y="0"/>
+          <a:ext cx="0" cy="0"/>
+          <a:chOff x="0" y="0"/>
+          <a:chExt cx="0" cy="0"/>
+        </a:xfrm>
+      </p:grpSpPr>
+      <p:sp>
+        <p:nvSpPr>
+          <p:cNvPr id="2" name="Title 1"/>
+          <p:cNvSpPr>
+            <a:spLocks noGrp="1"/>
+          </p:cNvSpPr>
+          <p:nvPr>
+            <p:ph type="title"/>
+          </p:nvPr>
+        </p:nvSpPr>
+        <p:spPr>
+          <a:xfrm>
+            <a:off x="576943" y="783136"/>
+            <a:ext cx="10515600" cy="1325563"/>
+          </a:xfrm>
+        </p:spPr>
+        <p:txBody>
+          <a:bodyPr>
+            <a:normAutofit fontScale="90000"/>
+          </a:bodyPr>
+          <a:lstStyle/>
+          <a:p>
+            <a:pPr algn="ctr"/>
+            <a:r>
+              <a:rPr lang="fr-FR" b="1" i="1" dirty="0">
+                <a:latin typeface="Andalus" panose="02020603050405020304" pitchFamily="18" charset="-78"/>
+                <a:cs typeface="Andalus" panose="02020603050405020304" pitchFamily="18" charset="-78"/>
+              </a:rPr>
+              <a:t/>
+            </a:r>
+            <a:br>
+              <a:rPr lang="fr-FR" b="1" i="1" dirty="0">
+                <a:latin typeface="Andalus" panose="02020603050405020304" pitchFamily="18" charset="-78"/>
+                <a:cs typeface="Andalus" panose="02020603050405020304" pitchFamily="18" charset="-78"/>
+              </a:rPr>
+            </a:br>
+            <a:r>
+              <a:rPr lang="en-US" b="1" i="1" dirty="0">
+                <a:latin typeface="Andalus" panose="02020603050405020304" pitchFamily="18" charset="-78"/>
+                <a:cs typeface="Andalus" panose="02020603050405020304" pitchFamily="18" charset="-78"/>
+              </a:rPr>
+              <a:t>w</a:t>
+            </a:r>
+            <a:r>
+              <a:rPr lang="fr-FR" sz="3600" b="1" i="1" dirty="0">
+                <a:latin typeface="Andalus" panose="02020603050405020304" pitchFamily="18" charset="-78"/>
+                <a:cs typeface="Andalus" panose="02020603050405020304" pitchFamily="18" charset="-78"/>
+              </a:rPr>
+              <a:t>est</a:t>
+            </a:r>
+            <a:r>
+              <a:rPr lang="fr-FR" b="1" i="1" dirty="0">
+                <a:latin typeface="Andalus" panose="02020603050405020304" pitchFamily="18" charset="-78"/>
+                <a:cs typeface="Andalus" panose="02020603050405020304" pitchFamily="18" charset="-78"/>
+              </a:rPr>
+              <a:t/>
+            </a:r>
+            <a:br>
+              <a:rPr lang="fr-FR" b="1" i="1" dirty="0">
+                <a:latin typeface="Andalus" panose="02020603050405020304" pitchFamily="18" charset="-78"/>
+                <a:cs typeface="Andalus" panose="02020603050405020304" pitchFamily="18" charset="-78"/>
+              </a:rPr>
+            </a:br>
+            <a:r>
+              <a:rPr lang="fr-FR" sz="2700" b="1" i="1" dirty="0">
+                <a:latin typeface="Andalus" panose="02020603050405020304" pitchFamily="18" charset="-78"/>
+                <a:cs typeface="Andalus" panose="02020603050405020304" pitchFamily="18" charset="-78"/>
+              </a:rPr>
+              <a:t>Y</a:t>
+            </a:r>
+            <a:r>
+              <a:rPr lang="fr-FR" sz="2700" dirty="0">
+                <a:latin typeface="Andalus" panose="02020603050405020304" pitchFamily="18" charset="-78"/>
+                <a:cs typeface="Andalus" panose="02020603050405020304" pitchFamily="18" charset="-78"/>
+              </a:rPr>
+              <a:t>ou </a:t>
+            </a:r>
+            <a:r>
+              <a:rPr lang="fr-FR" sz="2700" dirty="0" err="1">
+                <a:latin typeface="Andalus" panose="02020603050405020304" pitchFamily="18" charset="-78"/>
+                <a:cs typeface="Andalus" panose="02020603050405020304" pitchFamily="18" charset="-78"/>
+              </a:rPr>
+              <a:t>will</a:t>
+            </a:r>
+            <a:r>
+              <a:rPr lang="fr-FR" sz="2700" dirty="0">
+                <a:latin typeface="Andalus" panose="02020603050405020304" pitchFamily="18" charset="-78"/>
+                <a:cs typeface="Andalus" panose="02020603050405020304" pitchFamily="18" charset="-78"/>
+              </a:rPr>
+              <a:t> </a:t>
+            </a:r>
+            <a:r>
+              <a:rPr lang="fr-FR" sz="2700" dirty="0" err="1">
+                <a:latin typeface="Andalus" panose="02020603050405020304" pitchFamily="18" charset="-78"/>
+                <a:cs typeface="Andalus" panose="02020603050405020304" pitchFamily="18" charset="-78"/>
+              </a:rPr>
+              <a:t>find</a:t>
+            </a:r>
+            <a:r>
+              <a:rPr lang="fr-FR" sz="2700" dirty="0">
+                <a:latin typeface="Andalus" panose="02020603050405020304" pitchFamily="18" charset="-78"/>
+                <a:cs typeface="Andalus" panose="02020603050405020304" pitchFamily="18" charset="-78"/>
+              </a:rPr>
+              <a:t> a </a:t>
+            </a:r>
+            <a:r>
+              <a:rPr lang="en-US" sz="2700" dirty="0">
+                <a:latin typeface="Andalus" panose="02020603050405020304" pitchFamily="18" charset="-78"/>
+                <a:cs typeface="Andalus" panose="02020603050405020304" pitchFamily="18" charset="-78"/>
+              </a:rPr>
+              <a:t>very</a:t>
+            </a:r>
+            <a:r>
+              <a:rPr lang="fr-FR" sz="2700" dirty="0">
+                <a:latin typeface="Andalus" panose="02020603050405020304" pitchFamily="18" charset="-78"/>
+                <a:cs typeface="Andalus" panose="02020603050405020304" pitchFamily="18" charset="-78"/>
+              </a:rPr>
+              <a:t> </a:t>
+            </a:r>
+            <a:r>
+              <a:rPr lang="fr-FR" sz="2700" dirty="0" err="1">
+                <a:latin typeface="Andalus" panose="02020603050405020304" pitchFamily="18" charset="-78"/>
+                <a:cs typeface="Andalus" panose="02020603050405020304" pitchFamily="18" charset="-78"/>
+              </a:rPr>
+              <a:t>dark</a:t>
+            </a:r>
+            <a:r>
+              <a:rPr lang="fr-FR" sz="2700" dirty="0">
+                <a:latin typeface="Andalus" panose="02020603050405020304" pitchFamily="18" charset="-78"/>
+                <a:cs typeface="Andalus" panose="02020603050405020304" pitchFamily="18" charset="-78"/>
+              </a:rPr>
+              <a:t> and </a:t>
+            </a:r>
+            <a:r>
+              <a:rPr lang="fr-FR" sz="2700" dirty="0" err="1">
+                <a:latin typeface="Andalus" panose="02020603050405020304" pitchFamily="18" charset="-78"/>
+                <a:cs typeface="Andalus" panose="02020603050405020304" pitchFamily="18" charset="-78"/>
+              </a:rPr>
+              <a:t>scary</a:t>
+            </a:r>
+            <a:r>
+              <a:rPr lang="fr-FR" sz="2700" dirty="0">
+                <a:latin typeface="Andalus" panose="02020603050405020304" pitchFamily="18" charset="-78"/>
+                <a:cs typeface="Andalus" panose="02020603050405020304" pitchFamily="18" charset="-78"/>
+              </a:rPr>
+              <a:t> house</a:t>
+            </a:r>
+            <a:br>
+              <a:rPr lang="fr-FR" sz="2700" dirty="0">
+                <a:latin typeface="Andalus" panose="02020603050405020304" pitchFamily="18" charset="-78"/>
+                <a:cs typeface="Andalus" panose="02020603050405020304" pitchFamily="18" charset="-78"/>
+              </a:rPr>
+            </a:br>
+            <a:endParaRPr lang="fr-FR" sz="2700" dirty="0">
+              <a:latin typeface="Andalus" panose="02020603050405020304" pitchFamily="18" charset="-78"/>
+              <a:cs typeface="Andalus" panose="02020603050405020304" pitchFamily="18" charset="-78"/>
+            </a:endParaRPr>
+          </a:p>
+        </p:txBody>
+      </p:sp>
+      <p:sp>
+        <p:nvSpPr>
+          <p:cNvPr id="3" name="Content Placeholder 2"/>
+          <p:cNvSpPr>
+            <a:spLocks noGrp="1"/>
+          </p:cNvSpPr>
+          <p:nvPr>
+            <p:ph idx="1"/>
+          </p:nvPr>
+        </p:nvSpPr>
+        <p:spPr>
+          <a:xfrm>
+            <a:off x="780506" y="2108699"/>
+            <a:ext cx="10515600" cy="1392306"/>
+          </a:xfrm>
+        </p:spPr>
+        <p:txBody>
+          <a:bodyPr/>
+          <a:lstStyle/>
+          <a:p>
+            <a:pPr marL="0" indent="0" algn="ctr">
+              <a:buNone/>
+            </a:pPr>
+            <a:r>
+              <a:rPr lang="fr-FR" sz="2000" dirty="0">
+                <a:latin typeface="Andalus" panose="02020603050405020304" pitchFamily="18" charset="-78"/>
+                <a:cs typeface="Andalus" panose="02020603050405020304" pitchFamily="18" charset="-78"/>
+              </a:rPr>
+              <a:t>If </a:t>
+            </a:r>
+            <a:r>
+              <a:rPr lang="fr-FR" sz="2000" dirty="0" err="1">
+                <a:latin typeface="Andalus" panose="02020603050405020304" pitchFamily="18" charset="-78"/>
+                <a:cs typeface="Andalus" panose="02020603050405020304" pitchFamily="18" charset="-78"/>
+              </a:rPr>
+              <a:t>you</a:t>
+            </a:r>
+            <a:r>
+              <a:rPr lang="fr-FR" sz="2000" dirty="0">
+                <a:latin typeface="Andalus" panose="02020603050405020304" pitchFamily="18" charset="-78"/>
+                <a:cs typeface="Andalus" panose="02020603050405020304" pitchFamily="18" charset="-78"/>
+              </a:rPr>
+              <a:t> </a:t>
+            </a:r>
+            <a:r>
+              <a:rPr lang="fr-FR" sz="2000" dirty="0" err="1" smtClean="0">
+                <a:latin typeface="Andalus" panose="02020603050405020304" pitchFamily="18" charset="-78"/>
+                <a:cs typeface="Andalus" panose="02020603050405020304" pitchFamily="18" charset="-78"/>
+              </a:rPr>
+              <a:t>choose</a:t>
+            </a:r>
+            <a:r>
+              <a:rPr lang="fr-FR" sz="2000" dirty="0" smtClean="0">
+                <a:latin typeface="Andalus" panose="02020603050405020304" pitchFamily="18" charset="-78"/>
+                <a:cs typeface="Andalus" panose="02020603050405020304" pitchFamily="18" charset="-78"/>
+              </a:rPr>
+              <a:t> </a:t>
+            </a:r>
+            <a:r>
+              <a:rPr lang="fr-FR" sz="2000" dirty="0">
+                <a:latin typeface="Andalus" panose="02020603050405020304" pitchFamily="18" charset="-78"/>
+                <a:cs typeface="Andalus" panose="02020603050405020304" pitchFamily="18" charset="-78"/>
+              </a:rPr>
+              <a:t>to enter </a:t>
+            </a:r>
+            <a:r>
+              <a:rPr lang="fr-FR" sz="2000" dirty="0" err="1" smtClean="0">
+                <a:latin typeface="Andalus" panose="02020603050405020304" pitchFamily="18" charset="-78"/>
+                <a:cs typeface="Andalus" panose="02020603050405020304" pitchFamily="18" charset="-78"/>
+              </a:rPr>
+              <a:t>it</a:t>
+            </a:r>
+            <a:r>
+              <a:rPr lang="fr-FR" sz="2000" dirty="0" smtClean="0">
+                <a:latin typeface="Andalus" panose="02020603050405020304" pitchFamily="18" charset="-78"/>
+                <a:cs typeface="Andalus" panose="02020603050405020304" pitchFamily="18" charset="-78"/>
+              </a:rPr>
+              <a:t>, </a:t>
+            </a:r>
+            <a:r>
+              <a:rPr lang="fr-FR" sz="2000" dirty="0" err="1">
+                <a:latin typeface="Andalus" panose="02020603050405020304" pitchFamily="18" charset="-78"/>
+                <a:cs typeface="Andalus" panose="02020603050405020304" pitchFamily="18" charset="-78"/>
+              </a:rPr>
+              <a:t>you</a:t>
+            </a:r>
+            <a:r>
+              <a:rPr lang="fr-FR" sz="2000" dirty="0">
+                <a:latin typeface="Andalus" panose="02020603050405020304" pitchFamily="18" charset="-78"/>
+                <a:cs typeface="Andalus" panose="02020603050405020304" pitchFamily="18" charset="-78"/>
+              </a:rPr>
+              <a:t> have to </a:t>
+            </a:r>
+            <a:r>
+              <a:rPr lang="fr-FR" sz="2000" dirty="0" err="1" smtClean="0">
+                <a:latin typeface="Andalus" panose="02020603050405020304" pitchFamily="18" charset="-78"/>
+                <a:cs typeface="Andalus" panose="02020603050405020304" pitchFamily="18" charset="-78"/>
+              </a:rPr>
+              <a:t>choose</a:t>
+            </a:r>
+            <a:r>
+              <a:rPr lang="fr-FR" sz="2000" dirty="0" smtClean="0">
+                <a:latin typeface="Andalus" panose="02020603050405020304" pitchFamily="18" charset="-78"/>
+                <a:cs typeface="Andalus" panose="02020603050405020304" pitchFamily="18" charset="-78"/>
+              </a:rPr>
+              <a:t> </a:t>
+            </a:r>
+            <a:r>
+              <a:rPr lang="fr-FR" sz="2000" dirty="0" err="1">
+                <a:latin typeface="Andalus" panose="02020603050405020304" pitchFamily="18" charset="-78"/>
+                <a:cs typeface="Andalus" panose="02020603050405020304" pitchFamily="18" charset="-78"/>
+              </a:rPr>
+              <a:t>between</a:t>
+            </a:r>
+            <a:endParaRPr lang="fr-FR" sz="2000" dirty="0">
+              <a:latin typeface="Andalus" panose="02020603050405020304" pitchFamily="18" charset="-78"/>
+              <a:cs typeface="Andalus" panose="02020603050405020304" pitchFamily="18" charset="-78"/>
+            </a:endParaRPr>
+          </a:p>
+          <a:p>
+            <a:pPr marL="0" indent="0">
+              <a:buNone/>
+            </a:pPr>
+            <a:endParaRPr lang="fr-FR" dirty="0">
+              <a:latin typeface="Andalus" panose="02020603050405020304" pitchFamily="18" charset="-78"/>
+              <a:cs typeface="Andalus" panose="02020603050405020304" pitchFamily="18" charset="-78"/>
+            </a:endParaRPr>
+          </a:p>
+        </p:txBody>
+      </p:sp>
+      <p:pic>
+        <p:nvPicPr>
+          <p:cNvPr id="4" name="Picture 3"/>
+          <p:cNvPicPr>
+            <a:picLocks noChangeAspect="1"/>
+          </p:cNvPicPr>
+          <p:nvPr/>
+        </p:nvPicPr>
+        <p:blipFill>
+          <a:blip r:embed="rId2">
+            <a:extLst>
+              <a:ext uri="{28A0092B-C50C-407E-A947-70E740481C1C}">
+                <a14:useLocalDpi xmlns:a14="http://schemas.microsoft.com/office/drawing/2010/main" val="0"/>
+              </a:ext>
+            </a:extLst>
+          </a:blip>
+          <a:stretch>
+            <a:fillRect/>
+          </a:stretch>
+        </p:blipFill>
+        <p:spPr>
+          <a:xfrm>
+            <a:off x="3361781" y="3719647"/>
+            <a:ext cx="5353050" cy="2914650"/>
+          </a:xfrm>
+          <a:prstGeom prst="rect">
+            <a:avLst/>
+          </a:prstGeom>
+        </p:spPr>
+      </p:pic>
+      <p:sp>
+        <p:nvSpPr>
+          <p:cNvPr id="5" name="TextBox 4">
+            <a:extLst>
+              <a:ext uri="{FF2B5EF4-FFF2-40B4-BE49-F238E27FC236}">
+                <a16:creationId xmlns:a16="http://schemas.microsoft.com/office/drawing/2014/main" id="{A2B54435-60ED-4DD9-9468-50A6F075DC44}"/>
+              </a:ext>
+            </a:extLst>
+          </p:cNvPr>
+          <p:cNvSpPr txBox="1"/>
+          <p:nvPr/>
+        </p:nvSpPr>
+        <p:spPr>
+          <a:xfrm>
+            <a:off x="3855720" y="2985004"/>
+            <a:ext cx="1417320" cy="369332"/>
+          </a:xfrm>
+          <a:prstGeom prst="rect">
+            <a:avLst/>
+          </a:prstGeom>
+          <a:noFill/>
+        </p:spPr>
+        <p:txBody>
+          <a:bodyPr wrap="square" rtlCol="0">
+            <a:spAutoFit/>
+          </a:bodyPr>
+          <a:lstStyle/>
+          <a:p>
+            <a:r>
+              <a:rPr lang="fr-FR" dirty="0">
+                <a:latin typeface="Andalus" panose="02020603050405020304" pitchFamily="18" charset="-78"/>
+                <a:cs typeface="Andalus" panose="02020603050405020304" pitchFamily="18" charset="-78"/>
+              </a:rPr>
+              <a:t>K</a:t>
+            </a:r>
+            <a:r>
+              <a:rPr lang="fr-FR" sz="1800" dirty="0" smtClean="0">
+                <a:latin typeface="Andalus" panose="02020603050405020304" pitchFamily="18" charset="-78"/>
+                <a:cs typeface="Andalus" panose="02020603050405020304" pitchFamily="18" charset="-78"/>
+              </a:rPr>
+              <a:t>ill </a:t>
+            </a:r>
+            <a:r>
+              <a:rPr lang="en-US" sz="1800" dirty="0">
+                <a:latin typeface="Andalus" panose="02020603050405020304" pitchFamily="18" charset="-78"/>
+                <a:cs typeface="Andalus" panose="02020603050405020304" pitchFamily="18" charset="-78"/>
+              </a:rPr>
+              <a:t>your</a:t>
+            </a:r>
+            <a:r>
+              <a:rPr lang="fr-FR" sz="1800" dirty="0">
+                <a:latin typeface="Andalus" panose="02020603050405020304" pitchFamily="18" charset="-78"/>
+                <a:cs typeface="Andalus" panose="02020603050405020304" pitchFamily="18" charset="-78"/>
+              </a:rPr>
+              <a:t> son</a:t>
+            </a:r>
+            <a:endParaRPr lang="en-US" dirty="0"/>
+          </a:p>
+        </p:txBody>
+      </p:sp>
+      <p:sp>
+        <p:nvSpPr>
+          <p:cNvPr id="6" name="TextBox 5">
+            <a:extLst>
+              <a:ext uri="{FF2B5EF4-FFF2-40B4-BE49-F238E27FC236}">
+                <a16:creationId xmlns:a16="http://schemas.microsoft.com/office/drawing/2014/main" id="{72854E52-C68C-460E-AAB7-F9BA320C5587}"/>
+              </a:ext>
+            </a:extLst>
+          </p:cNvPr>
+          <p:cNvSpPr txBox="1"/>
+          <p:nvPr/>
+        </p:nvSpPr>
+        <p:spPr>
+          <a:xfrm>
+            <a:off x="6347597" y="3031170"/>
+            <a:ext cx="1936976" cy="923330"/>
+          </a:xfrm>
+          <a:prstGeom prst="rect">
+            <a:avLst/>
+          </a:prstGeom>
+          <a:noFill/>
+        </p:spPr>
+        <p:txBody>
+          <a:bodyPr wrap="square" rtlCol="0">
+            <a:spAutoFit/>
+          </a:bodyPr>
+          <a:lstStyle/>
+          <a:p>
+            <a:r>
+              <a:rPr lang="fr-FR" dirty="0" err="1" smtClean="0">
+                <a:latin typeface="Andalus" panose="02020603050405020304" pitchFamily="18" charset="-78"/>
+                <a:cs typeface="Andalus" panose="02020603050405020304" pitchFamily="18" charset="-78"/>
+              </a:rPr>
+              <a:t>Get</a:t>
+            </a:r>
+            <a:r>
+              <a:rPr lang="fr-FR" dirty="0" smtClean="0">
+                <a:latin typeface="Andalus" panose="02020603050405020304" pitchFamily="18" charset="-78"/>
+                <a:cs typeface="Andalus" panose="02020603050405020304" pitchFamily="18" charset="-78"/>
+              </a:rPr>
+              <a:t> </a:t>
+            </a:r>
+            <a:r>
+              <a:rPr lang="fr-FR" dirty="0" err="1" smtClean="0">
+                <a:latin typeface="Andalus" panose="02020603050405020304" pitchFamily="18" charset="-78"/>
+                <a:cs typeface="Andalus" panose="02020603050405020304" pitchFamily="18" charset="-78"/>
+              </a:rPr>
+              <a:t>betrayed</a:t>
+            </a:r>
+            <a:r>
+              <a:rPr lang="fr-FR" dirty="0" smtClean="0">
+                <a:latin typeface="Andalus" panose="02020603050405020304" pitchFamily="18" charset="-78"/>
+                <a:cs typeface="Andalus" panose="02020603050405020304" pitchFamily="18" charset="-78"/>
+              </a:rPr>
+              <a:t> by </a:t>
+            </a:r>
+            <a:r>
+              <a:rPr lang="fr-FR" dirty="0" err="1" smtClean="0">
+                <a:latin typeface="Andalus" panose="02020603050405020304" pitchFamily="18" charset="-78"/>
+                <a:cs typeface="Andalus" panose="02020603050405020304" pitchFamily="18" charset="-78"/>
+              </a:rPr>
+              <a:t>Zafir</a:t>
+            </a:r>
+            <a:endParaRPr lang="fr-FR" dirty="0">
+              <a:latin typeface="Andalus" panose="02020603050405020304" pitchFamily="18" charset="-78"/>
+              <a:cs typeface="Andalus" panose="02020603050405020304" pitchFamily="18" charset="-78"/>
+            </a:endParaRPr>
+          </a:p>
+          <a:p>
+            <a:endParaRPr lang="en-US" dirty="0"/>
+          </a:p>
+        </p:txBody>
+      </p:sp>
+      <p:cxnSp>
+        <p:nvCxnSpPr>
+          <p:cNvPr id="8" name="Straight Arrow Connector 7">
+            <a:extLst>
+              <a:ext uri="{FF2B5EF4-FFF2-40B4-BE49-F238E27FC236}">
+                <a16:creationId xmlns:a16="http://schemas.microsoft.com/office/drawing/2014/main" id="{AD21A608-CFD8-470E-937F-1F68906A1D17}"/>
+              </a:ext>
+            </a:extLst>
+          </p:cNvPr>
+          <p:cNvCxnSpPr/>
+          <p:nvPr/>
+        </p:nvCxnSpPr>
+        <p:spPr>
+          <a:xfrm flipH="1">
+            <a:off x="4869180" y="2499360"/>
+            <a:ext cx="1169126" cy="485644"/>
+          </a:xfrm>
+          <a:prstGeom prst="straightConnector1">
+            <a:avLst/>
+          </a:prstGeom>
+          <a:ln>
+            <a:tailEnd type="triangle"/>
+          </a:ln>
+        </p:spPr>
+        <p:style>
+          <a:lnRef idx="1">
+            <a:schemeClr val="dk1"/>
+          </a:lnRef>
+          <a:fillRef idx="0">
+            <a:schemeClr val="dk1"/>
+          </a:fillRef>
+          <a:effectRef idx="0">
+            <a:schemeClr val="dk1"/>
+          </a:effectRef>
+          <a:fontRef idx="minor">
+            <a:schemeClr val="tx1"/>
+          </a:fontRef>
+        </p:style>
+      </p:cxnSp>
+      <p:cxnSp>
+        <p:nvCxnSpPr>
+          <p:cNvPr id="10" name="Straight Arrow Connector 9">
+            <a:extLst>
+              <a:ext uri="{FF2B5EF4-FFF2-40B4-BE49-F238E27FC236}">
+                <a16:creationId xmlns:a16="http://schemas.microsoft.com/office/drawing/2014/main" id="{82043F52-66A8-4202-A301-A03A7D6EFB54}"/>
+              </a:ext>
+            </a:extLst>
+          </p:cNvPr>
+          <p:cNvCxnSpPr/>
+          <p:nvPr/>
+        </p:nvCxnSpPr>
+        <p:spPr>
+          <a:xfrm>
+            <a:off x="6038306" y="2506980"/>
+            <a:ext cx="880656" cy="524190"/>
+          </a:xfrm>
+          <a:prstGeom prst="straightConnector1">
+            <a:avLst/>
+          </a:prstGeom>
+          <a:ln>
+            <a:tailEnd type="triangle"/>
+          </a:ln>
+        </p:spPr>
+        <p:style>
+          <a:lnRef idx="1">
+            <a:schemeClr val="dk1"/>
+          </a:lnRef>
+          <a:fillRef idx="0">
+            <a:schemeClr val="dk1"/>
+          </a:fillRef>
+          <a:effectRef idx="0">
+            <a:schemeClr val="dk1"/>
+          </a:effectRef>
+          <a:fontRef idx="minor">
+            <a:schemeClr val="tx1"/>
+          </a:fontRef>
+        </p:style>
+      </p:cxnSp>
+    </p:spTree>
+    <p:extLst>
+      <p:ext uri="{BB962C8B-B14F-4D97-AF65-F5344CB8AC3E}">
+        <p14:creationId xmlns:p14="http://schemas.microsoft.com/office/powerpoint/2010/main" val="1219533852"/>
       </p:ext>
     </p:extLst>
   </p:cSld>

</xml_diff>